<commit_message>
Actualización final EF 4
</commit_message>
<xml_diff>
--- a/Presentación/Math Match_.pptx
+++ b/Presentación/Math Match_.pptx
@@ -3420,10 +3420,10 @@
       </p:pic>
       <p:pic>
         <p:nvPicPr>
-          <p:cNvPr id="4" name="Imagen 3">
-            <a:extLst>
-              <a:ext uri="{FF2B5EF4-FFF2-40B4-BE49-F238E27FC236}">
-                <a16:creationId xmlns:a16="http://schemas.microsoft.com/office/drawing/2014/main" id="{D8B757C3-2B58-408D-A69E-8C1153B4ACD8}"/>
+          <p:cNvPr id="8" name="Imagen 7">
+            <a:extLst>
+              <a:ext uri="{FF2B5EF4-FFF2-40B4-BE49-F238E27FC236}">
+                <a16:creationId xmlns:a16="http://schemas.microsoft.com/office/drawing/2014/main" id="{03324044-986F-43DF-B803-D5787E1D2473}"/>
               </a:ext>
             </a:extLst>
           </p:cNvPr>
@@ -3440,8 +3440,8 @@
         </p:blipFill>
         <p:spPr>
           <a:xfrm>
-            <a:off x="538162" y="902773"/>
-            <a:ext cx="7548563" cy="3037117"/>
+            <a:off x="383756" y="1004627"/>
+            <a:ext cx="7788302" cy="3134245"/>
           </a:xfrm>
           <a:prstGeom prst="rect">
             <a:avLst/>

</xml_diff>